<commit_message>
Added charts for all categories
</commit_message>
<xml_diff>
--- a/test.pptx
+++ b/test.pptx
@@ -111,6 +111,8 @@
 
 <file path=ppt/charts/chart1.xml><?xml version="1.0" encoding="utf-8"?>
 <c:chartSpace xmlns:c="http://schemas.openxmlformats.org/drawingml/2006/chart" xmlns:a="http://schemas.openxmlformats.org/drawingml/2006/main" xmlns:r="http://schemas.openxmlformats.org/officeDocument/2006/relationships">
+  <c:date1904 val="0"/>
+  <c:roundedCorners val="0"/>
   <c:chart>
     <c:title>
       <c:tx>
@@ -129,7 +131,8 @@
     </c:title>
     <c:autoTitleDeleted val="0"/>
     <c:plotArea>
-      <c:pieChart>
+      <c:layout/>
+      <c:doughnutChart>
         <c:varyColors val="1"/>
         <c:ser>
           <c:idx val="0"/>
@@ -182,10 +185,10 @@
                 <c:formatCode>General</c:formatCode>
                 <c:ptCount val="2"/>
                 <c:pt idx="0">
-                  <c:v>0.8438252358211311</c:v>
+                  <c:v>0.8575907590759075</c:v>
                 </c:pt>
                 <c:pt idx="1">
-                  <c:v>0.15617476417886886</c:v>
+                  <c:v>0.1424092409240924</c:v>
                 </c:pt>
               </c:numCache>
             </c:numRef>
@@ -193,22 +196,26 @@
         </c:ser>
         <c:dLbls>
           <c:numFmt formatCode="0%" sourceLinked="0"/>
-          <c:dLblPos val="outEnd"/>
           <c:showLegendKey val="0"/>
-          <c:showVal val="1"/>
+          <c:showVal val="0"/>
           <c:showCatName val="0"/>
           <c:showSerName val="0"/>
           <c:showPercent val="0"/>
           <c:showBubbleSize val="0"/>
           <c:showLeaderLines val="1"/>
         </c:dLbls>
-      </c:pieChart>
+        <c:firstSliceAng val="0"/>
+        <c:holeSize val="50"/>
+      </c:doughnutChart>
     </c:plotArea>
     <c:legend>
-      <c:legendPos/>
+      <c:legendPos val="b"/>
+      <c:layout/>
       <c:overlay val="0"/>
     </c:legend>
+    <c:plotVisOnly val="1"/>
     <c:dispBlanksAs val="gap"/>
+    <c:showDLblsOverMax val="0"/>
   </c:chart>
   <c:txPr>
     <a:bodyPr/>
@@ -217,7 +224,7 @@
       <a:pPr>
         <a:defRPr sz="1800"/>
       </a:pPr>
-      <a:endParaRPr lang="en-US"/>
+      <a:endParaRPr/>
     </a:p>
   </c:txPr>
   <c:externalData r:id="rId1">
@@ -228,6 +235,8 @@
 
 <file path=ppt/charts/chart2.xml><?xml version="1.0" encoding="utf-8"?>
 <c:chartSpace xmlns:c="http://schemas.openxmlformats.org/drawingml/2006/chart" xmlns:a="http://schemas.openxmlformats.org/drawingml/2006/main" xmlns:r="http://schemas.openxmlformats.org/officeDocument/2006/relationships">
+  <c:date1904 val="0"/>
+  <c:roundedCorners val="0"/>
   <c:chart>
     <c:title>
       <c:tx>
@@ -236,7 +245,7 @@
           <a:lstStyle/>
           <a:p>
             <a:r>
-              <a:t>Security</a:t>
+              <a:t>Reliability</a:t>
             </a:r>
           </a:p>
         </c:rich>
@@ -246,7 +255,261 @@
     </c:title>
     <c:autoTitleDeleted val="0"/>
     <c:plotArea>
-      <c:pieChart>
+      <c:layout/>
+      <c:doughnutChart>
+        <c:varyColors val="1"/>
+        <c:ser>
+          <c:idx val="0"/>
+          <c:order val="0"/>
+          <c:tx>
+            <c:strRef>
+              <c:f>Sheet1!$B$1</c:f>
+              <c:strCache>
+                <c:ptCount val="1"/>
+                <c:pt idx="0">
+                  <c:v/>
+                </c:pt>
+              </c:strCache>
+            </c:strRef>
+          </c:tx>
+          <c:dPt>
+            <c:idx val="0"/>
+            <c:spPr>
+              <a:solidFill>
+                <a:srgbClr val="00FF00"/>
+              </a:solidFill>
+            </c:spPr>
+          </c:dPt>
+          <c:dPt>
+            <c:idx val="1"/>
+            <c:spPr>
+              <a:solidFill>
+                <a:srgbClr val="FF0000"/>
+              </a:solidFill>
+            </c:spPr>
+          </c:dPt>
+          <c:cat>
+            <c:strRef>
+              <c:f>Sheet1!$A$2:$A$3</c:f>
+              <c:strCache>
+                <c:ptCount val="2"/>
+                <c:pt idx="0">
+                  <c:v>Success</c:v>
+                </c:pt>
+                <c:pt idx="1">
+                  <c:v>Failure</c:v>
+                </c:pt>
+              </c:strCache>
+            </c:strRef>
+          </c:cat>
+          <c:val>
+            <c:numRef>
+              <c:f>Sheet1!$B$2:$B$3</c:f>
+              <c:numCache>
+                <c:formatCode>General</c:formatCode>
+                <c:ptCount val="2"/>
+                <c:pt idx="0">
+                  <c:v>0.8328859060402685</c:v>
+                </c:pt>
+                <c:pt idx="1">
+                  <c:v>0.16711409395973154</c:v>
+                </c:pt>
+              </c:numCache>
+            </c:numRef>
+          </c:val>
+        </c:ser>
+        <c:dLbls>
+          <c:numFmt formatCode="0%" sourceLinked="0"/>
+          <c:showLegendKey val="0"/>
+          <c:showVal val="0"/>
+          <c:showCatName val="0"/>
+          <c:showSerName val="0"/>
+          <c:showPercent val="0"/>
+          <c:showBubbleSize val="0"/>
+          <c:showLeaderLines val="1"/>
+        </c:dLbls>
+        <c:firstSliceAng val="0"/>
+        <c:holeSize val="50"/>
+      </c:doughnutChart>
+    </c:plotArea>
+    <c:legend>
+      <c:legendPos val="b"/>
+      <c:layout/>
+      <c:overlay val="0"/>
+    </c:legend>
+    <c:plotVisOnly val="1"/>
+    <c:dispBlanksAs val="gap"/>
+    <c:showDLblsOverMax val="0"/>
+  </c:chart>
+  <c:txPr>
+    <a:bodyPr/>
+    <a:lstStyle/>
+    <a:p>
+      <a:pPr>
+        <a:defRPr sz="1800"/>
+      </a:pPr>
+      <a:endParaRPr/>
+    </a:p>
+  </c:txPr>
+  <c:externalData r:id="rId1">
+    <c:autoUpdate val="0"/>
+  </c:externalData>
+</c:chartSpace>
+</file>
+
+<file path=ppt/charts/chart3.xml><?xml version="1.0" encoding="utf-8"?>
+<c:chartSpace xmlns:c="http://schemas.openxmlformats.org/drawingml/2006/chart" xmlns:a="http://schemas.openxmlformats.org/drawingml/2006/main" xmlns:r="http://schemas.openxmlformats.org/officeDocument/2006/relationships">
+  <c:date1904 val="0"/>
+  <c:roundedCorners val="0"/>
+  <c:chart>
+    <c:title>
+      <c:tx>
+        <c:rich>
+          <a:bodyPr/>
+          <a:lstStyle/>
+          <a:p>
+            <a:r>
+              <a:t>Performance</a:t>
+            </a:r>
+          </a:p>
+          <a:p>
+            <a:r>
+              <a:t>Efficiency</a:t>
+            </a:r>
+          </a:p>
+        </c:rich>
+      </c:tx>
+      <c:layout/>
+      <c:overlay val="0"/>
+    </c:title>
+    <c:autoTitleDeleted val="0"/>
+    <c:plotArea>
+      <c:layout/>
+      <c:doughnutChart>
+        <c:varyColors val="1"/>
+        <c:ser>
+          <c:idx val="0"/>
+          <c:order val="0"/>
+          <c:tx>
+            <c:strRef>
+              <c:f>Sheet1!$B$1</c:f>
+              <c:strCache>
+                <c:ptCount val="1"/>
+                <c:pt idx="0">
+                  <c:v/>
+                </c:pt>
+              </c:strCache>
+            </c:strRef>
+          </c:tx>
+          <c:dPt>
+            <c:idx val="0"/>
+            <c:spPr>
+              <a:solidFill>
+                <a:srgbClr val="00FF00"/>
+              </a:solidFill>
+            </c:spPr>
+          </c:dPt>
+          <c:dPt>
+            <c:idx val="1"/>
+            <c:spPr>
+              <a:solidFill>
+                <a:srgbClr val="FF0000"/>
+              </a:solidFill>
+            </c:spPr>
+          </c:dPt>
+          <c:cat>
+            <c:strRef>
+              <c:f>Sheet1!$A$2:$A$3</c:f>
+              <c:strCache>
+                <c:ptCount val="2"/>
+                <c:pt idx="0">
+                  <c:v>Success</c:v>
+                </c:pt>
+                <c:pt idx="1">
+                  <c:v>Failure</c:v>
+                </c:pt>
+              </c:strCache>
+            </c:strRef>
+          </c:cat>
+          <c:val>
+            <c:numRef>
+              <c:f>Sheet1!$B$2:$B$3</c:f>
+              <c:numCache>
+                <c:formatCode>General</c:formatCode>
+                <c:ptCount val="2"/>
+                <c:pt idx="0">
+                  <c:v>1.0</c:v>
+                </c:pt>
+                <c:pt idx="1">
+                  <c:v>0.0</c:v>
+                </c:pt>
+              </c:numCache>
+            </c:numRef>
+          </c:val>
+        </c:ser>
+        <c:dLbls>
+          <c:numFmt formatCode="0%" sourceLinked="0"/>
+          <c:showLegendKey val="0"/>
+          <c:showVal val="0"/>
+          <c:showCatName val="0"/>
+          <c:showSerName val="0"/>
+          <c:showPercent val="0"/>
+          <c:showBubbleSize val="0"/>
+          <c:showLeaderLines val="1"/>
+        </c:dLbls>
+        <c:firstSliceAng val="0"/>
+        <c:holeSize val="50"/>
+      </c:doughnutChart>
+    </c:plotArea>
+    <c:legend>
+      <c:legendPos val="b"/>
+      <c:layout/>
+      <c:overlay val="0"/>
+    </c:legend>
+    <c:plotVisOnly val="1"/>
+    <c:dispBlanksAs val="gap"/>
+    <c:showDLblsOverMax val="0"/>
+  </c:chart>
+  <c:txPr>
+    <a:bodyPr/>
+    <a:lstStyle/>
+    <a:p>
+      <a:pPr>
+        <a:defRPr sz="1800"/>
+      </a:pPr>
+      <a:endParaRPr/>
+    </a:p>
+  </c:txPr>
+  <c:externalData r:id="rId1">
+    <c:autoUpdate val="0"/>
+  </c:externalData>
+</c:chartSpace>
+</file>
+
+<file path=ppt/charts/chart4.xml><?xml version="1.0" encoding="utf-8"?>
+<c:chartSpace xmlns:c="http://schemas.openxmlformats.org/drawingml/2006/chart" xmlns:a="http://schemas.openxmlformats.org/drawingml/2006/main" xmlns:r="http://schemas.openxmlformats.org/officeDocument/2006/relationships">
+  <c:date1904 val="0"/>
+  <c:roundedCorners val="0"/>
+  <c:chart>
+    <c:title>
+      <c:tx>
+        <c:rich>
+          <a:bodyPr/>
+          <a:lstStyle/>
+          <a:p>
+            <a:r>
+              <a:t>Security</a:t>
+            </a:r>
+          </a:p>
+        </c:rich>
+      </c:tx>
+      <c:layout/>
+      <c:overlay val="0"/>
+    </c:title>
+    <c:autoTitleDeleted val="0"/>
+    <c:plotArea>
+      <c:layout/>
+      <c:doughnutChart>
         <c:varyColors val="1"/>
         <c:ser>
           <c:idx val="0"/>
@@ -310,22 +573,26 @@
         </c:ser>
         <c:dLbls>
           <c:numFmt formatCode="0%" sourceLinked="0"/>
-          <c:dLblPos val="outEnd"/>
           <c:showLegendKey val="0"/>
-          <c:showVal val="1"/>
+          <c:showVal val="0"/>
           <c:showCatName val="0"/>
           <c:showSerName val="0"/>
           <c:showPercent val="0"/>
           <c:showBubbleSize val="0"/>
           <c:showLeaderLines val="1"/>
         </c:dLbls>
-      </c:pieChart>
+        <c:firstSliceAng val="0"/>
+        <c:holeSize val="50"/>
+      </c:doughnutChart>
     </c:plotArea>
     <c:legend>
-      <c:legendPos/>
+      <c:legendPos val="b"/>
+      <c:layout/>
       <c:overlay val="0"/>
     </c:legend>
+    <c:plotVisOnly val="1"/>
     <c:dispBlanksAs val="gap"/>
+    <c:showDLblsOverMax val="0"/>
   </c:chart>
   <c:txPr>
     <a:bodyPr/>
@@ -334,7 +601,7 @@
       <a:pPr>
         <a:defRPr sz="1800"/>
       </a:pPr>
-      <a:endParaRPr lang="en-US"/>
+      <a:endParaRPr/>
     </a:p>
   </c:txPr>
   <c:externalData r:id="rId1">
@@ -3412,7 +3679,7 @@
         </p:nvSpPr>
         <p:spPr>
           <a:xfrm>
-            <a:off x="914400" y="914400"/>
+            <a:off x="457200" y="457200"/>
             <a:ext cx="914400" cy="914400"/>
           </a:xfrm>
           <a:prstGeom prst="rect">
@@ -3427,7 +3694,7 @@
           <a:lstStyle/>
           <a:p>
             <a:pPr>
-              <a:defRPr sz="1200"/>
+              <a:defRPr sz="1500"/>
             </a:pPr>
             <a:r>
               <a:t>Platform: AWS</a:t>
@@ -3435,7 +3702,7 @@
           </a:p>
           <a:p>
             <a:pPr>
-              <a:defRPr sz="1200"/>
+              <a:defRPr sz="1500"/>
             </a:pPr>
             <a:r>
               <a:t>Account Number: 236</a:t>
@@ -3443,7 +3710,7 @@
           </a:p>
           <a:p>
             <a:pPr>
-              <a:defRPr sz="1200"/>
+              <a:defRPr sz="1500"/>
             </a:pPr>
             <a:r>
               <a:t>Category: security, reliability, performance-efficiency</a:t>
@@ -3451,7 +3718,7 @@
           </a:p>
           <a:p>
             <a:pPr>
-              <a:defRPr sz="1200"/>
+              <a:defRPr sz="1500"/>
             </a:pPr>
             <a:r>
               <a:t>Frameworks: NIST Cybersecurity Framework v1.1</a:t>
@@ -3459,7 +3726,7 @@
           </a:p>
           <a:p>
             <a:pPr>
-              <a:defRPr sz="1200"/>
+              <a:defRPr sz="1500"/>
             </a:pPr>
             <a:r>
               <a:t>Risk Levels: High, Very High, Extreme</a:t>
@@ -3476,8 +3743,8 @@
           <p:nvPr/>
         </p:nvGraphicFramePr>
         <p:xfrm>
-          <a:off x="914400" y="2286000"/>
-          <a:ext cx="3657600" cy="3657600"/>
+          <a:off x="457200" y="1828800"/>
+          <a:ext cx="2743200" cy="3429000"/>
         </p:xfrm>
         <a:graphic>
           <a:graphicData uri="http://schemas.openxmlformats.org/drawingml/2006/chart">
@@ -3493,7 +3760,7 @@
         </p:nvSpPr>
         <p:spPr>
           <a:xfrm>
-            <a:off x="914400" y="6400800"/>
+            <a:off x="3200400" y="2743200"/>
             <a:ext cx="914400" cy="914400"/>
           </a:xfrm>
           <a:prstGeom prst="rect">
@@ -3506,43 +3773,172 @@
             <a:spAutoFit/>
           </a:bodyPr>
           <a:lstStyle/>
-          <a:p/>
           <a:p>
             <a:pPr>
-              <a:defRPr sz="1200"/>
+              <a:defRPr sz="1500"/>
             </a:pPr>
             <a:r>
-              <a:t>Filter checked: 50674</a:t>
+              <a:t>Filter checked: 42420</a:t>
             </a:r>
           </a:p>
           <a:p>
             <a:pPr>
-              <a:defRPr sz="1200"/>
+              <a:defRPr sz="1500"/>
             </a:pPr>
             <a:r>
-              <a:t>Succeeded: 42760</a:t>
+              <a:t>Succeeded: 36379</a:t>
             </a:r>
           </a:p>
           <a:p>
             <a:pPr>
-              <a:defRPr sz="1200"/>
+              <a:defRPr sz="1500"/>
             </a:pPr>
             <a:r>
-              <a:t>Failed: 7914</a:t>
+              <a:t>Failed: 6041</a:t>
+            </a:r>
+          </a:p>
+        </p:txBody>
+      </p:sp>
+      <p:graphicFrame>
+        <p:nvGraphicFramePr>
+          <p:cNvPr id="5" name="Chart 4"/>
+          <p:cNvGraphicFramePr>
+            <a:graphicFrameLocks noGrp="1"/>
+          </p:cNvGraphicFramePr>
+          <p:nvPr/>
+        </p:nvGraphicFramePr>
+        <p:xfrm>
+          <a:off x="5029200" y="1828800"/>
+          <a:ext cx="2743200" cy="3429000"/>
+        </p:xfrm>
+        <a:graphic>
+          <a:graphicData uri="http://schemas.openxmlformats.org/drawingml/2006/chart">
+            <c:chart xmlns:c="http://schemas.openxmlformats.org/drawingml/2006/chart" r:id="rId3"/>
+          </a:graphicData>
+        </a:graphic>
+      </p:graphicFrame>
+      <p:sp>
+        <p:nvSpPr>
+          <p:cNvPr id="6" name="TextBox 5"/>
+          <p:cNvSpPr txBox="1"/>
+          <p:nvPr/>
+        </p:nvSpPr>
+        <p:spPr>
+          <a:xfrm>
+            <a:off x="7772400" y="2743200"/>
+            <a:ext cx="914400" cy="914400"/>
+          </a:xfrm>
+          <a:prstGeom prst="rect">
+            <a:avLst/>
+          </a:prstGeom>
+          <a:noFill/>
+        </p:spPr>
+        <p:txBody>
+          <a:bodyPr wrap="none">
+            <a:spAutoFit/>
+          </a:bodyPr>
+          <a:lstStyle/>
+          <a:p>
+            <a:pPr>
+              <a:defRPr sz="1500"/>
+            </a:pPr>
+            <a:r>
+              <a:t>Filter checked: 1490</a:t>
+            </a:r>
+          </a:p>
+          <a:p>
+            <a:pPr>
+              <a:defRPr sz="1500"/>
+            </a:pPr>
+            <a:r>
+              <a:t>Succeeded: 1241</a:t>
+            </a:r>
+          </a:p>
+          <a:p>
+            <a:pPr>
+              <a:defRPr sz="1500"/>
+            </a:pPr>
+            <a:r>
+              <a:t>Failed: 249</a:t>
+            </a:r>
+          </a:p>
+        </p:txBody>
+      </p:sp>
+      <p:graphicFrame>
+        <p:nvGraphicFramePr>
+          <p:cNvPr id="7" name="Chart 6"/>
+          <p:cNvGraphicFramePr>
+            <a:graphicFrameLocks noGrp="1"/>
+          </p:cNvGraphicFramePr>
+          <p:nvPr/>
+        </p:nvGraphicFramePr>
+        <p:xfrm>
+          <a:off x="9601200" y="1828800"/>
+          <a:ext cx="2743200" cy="3429000"/>
+        </p:xfrm>
+        <a:graphic>
+          <a:graphicData uri="http://schemas.openxmlformats.org/drawingml/2006/chart">
+            <c:chart xmlns:c="http://schemas.openxmlformats.org/drawingml/2006/chart" r:id="rId4"/>
+          </a:graphicData>
+        </a:graphic>
+      </p:graphicFrame>
+      <p:sp>
+        <p:nvSpPr>
+          <p:cNvPr id="8" name="TextBox 7"/>
+          <p:cNvSpPr txBox="1"/>
+          <p:nvPr/>
+        </p:nvSpPr>
+        <p:spPr>
+          <a:xfrm>
+            <a:off x="12344400" y="2743200"/>
+            <a:ext cx="914400" cy="914400"/>
+          </a:xfrm>
+          <a:prstGeom prst="rect">
+            <a:avLst/>
+          </a:prstGeom>
+          <a:noFill/>
+        </p:spPr>
+        <p:txBody>
+          <a:bodyPr wrap="none">
+            <a:spAutoFit/>
+          </a:bodyPr>
+          <a:lstStyle/>
+          <a:p>
+            <a:pPr>
+              <a:defRPr sz="1500"/>
+            </a:pPr>
+            <a:r>
+              <a:t>Filter checked: 10</a:t>
+            </a:r>
+          </a:p>
+          <a:p>
+            <a:pPr>
+              <a:defRPr sz="1500"/>
+            </a:pPr>
+            <a:r>
+              <a:t>Succeeded: 10</a:t>
+            </a:r>
+          </a:p>
+          <a:p>
+            <a:pPr>
+              <a:defRPr sz="1500"/>
+            </a:pPr>
+            <a:r>
+              <a:t>Failed: 0</a:t>
             </a:r>
           </a:p>
         </p:txBody>
       </p:sp>
       <p:pic>
         <p:nvPicPr>
-          <p:cNvPr id="5" name="Picture 4" descr="footer.png"/>
+          <p:cNvPr id="9" name="Picture 8" descr="footer.png"/>
           <p:cNvPicPr>
             <a:picLocks noChangeAspect="1"/>
           </p:cNvPicPr>
           <p:nvPr/>
         </p:nvPicPr>
         <p:blipFill>
-          <a:blip r:embed="rId3"/>
+          <a:blip r:embed="rId5"/>
           <a:stretch>
             <a:fillRect/>
           </a:stretch>
@@ -3583,7 +3979,7 @@
         </p:nvSpPr>
         <p:spPr>
           <a:xfrm>
-            <a:off x="914400" y="914400"/>
+            <a:off x="457200" y="457200"/>
             <a:ext cx="914400" cy="914400"/>
           </a:xfrm>
           <a:prstGeom prst="rect">
@@ -3598,7 +3994,7 @@
           <a:lstStyle/>
           <a:p>
             <a:pPr>
-              <a:defRPr sz="1200"/>
+              <a:defRPr sz="1500"/>
             </a:pPr>
             <a:r>
               <a:t>Platform: GCP</a:t>
@@ -3606,7 +4002,7 @@
           </a:p>
           <a:p>
             <a:pPr>
-              <a:defRPr sz="1200"/>
+              <a:defRPr sz="1500"/>
             </a:pPr>
             <a:r>
               <a:t>Account Number: 133</a:t>
@@ -3614,7 +4010,7 @@
           </a:p>
           <a:p>
             <a:pPr>
-              <a:defRPr sz="1200"/>
+              <a:defRPr sz="1500"/>
             </a:pPr>
             <a:r>
               <a:t>Category: security, reliability, performance-efficiency</a:t>
@@ -3622,7 +4018,7 @@
           </a:p>
           <a:p>
             <a:pPr>
-              <a:defRPr sz="1200"/>
+              <a:defRPr sz="1500"/>
             </a:pPr>
             <a:r>
               <a:t>Frameworks: NIST Cybersecurity Framework v1.1</a:t>
@@ -3630,7 +4026,7 @@
           </a:p>
           <a:p>
             <a:pPr>
-              <a:defRPr sz="1200"/>
+              <a:defRPr sz="1500"/>
             </a:pPr>
             <a:r>
               <a:t>Risk Levels: High, Very High</a:t>
@@ -3647,8 +4043,8 @@
           <p:nvPr/>
         </p:nvGraphicFramePr>
         <p:xfrm>
-          <a:off x="914400" y="2286000"/>
-          <a:ext cx="3657600" cy="3657600"/>
+          <a:off x="457200" y="1828800"/>
+          <a:ext cx="2743200" cy="3429000"/>
         </p:xfrm>
         <a:graphic>
           <a:graphicData uri="http://schemas.openxmlformats.org/drawingml/2006/chart">
@@ -3664,7 +4060,7 @@
         </p:nvSpPr>
         <p:spPr>
           <a:xfrm>
-            <a:off x="914400" y="6400800"/>
+            <a:off x="3200400" y="2743200"/>
             <a:ext cx="914400" cy="914400"/>
           </a:xfrm>
           <a:prstGeom prst="rect">
@@ -3677,10 +4073,9 @@
             <a:spAutoFit/>
           </a:bodyPr>
           <a:lstStyle/>
-          <a:p/>
           <a:p>
             <a:pPr>
-              <a:defRPr sz="1200"/>
+              <a:defRPr sz="1500"/>
             </a:pPr>
             <a:r>
               <a:t>Filter checked: 152</a:t>
@@ -3688,7 +4083,7 @@
           </a:p>
           <a:p>
             <a:pPr>
-              <a:defRPr sz="1200"/>
+              <a:defRPr sz="1500"/>
             </a:pPr>
             <a:r>
               <a:t>Succeeded: 16</a:t>
@@ -3696,7 +4091,7 @@
           </a:p>
           <a:p>
             <a:pPr>
-              <a:defRPr sz="1200"/>
+              <a:defRPr sz="1500"/>
             </a:pPr>
             <a:r>
               <a:t>Failed: 136</a:t>

</xml_diff>

<commit_message>
Fixed labels for doughnut chart
</commit_message>
<xml_diff>
--- a/test.pptx
+++ b/test.pptx
@@ -164,6 +164,55 @@
               </a:solidFill>
             </c:spPr>
           </c:dPt>
+          <c:dLbls>
+            <c:dLbl>
+              <c:idx val="0"/>
+              <c:tx>
+                <c:rich>
+                  <a:bodyPr/>
+                  <a:lstStyle/>
+                  <a:p>
+                    <a:r>
+                      <a:t>84%</a:t>
+                    </a:r>
+                  </a:p>
+                </c:rich>
+              </c:tx>
+              <c:showLegendKey val="0"/>
+              <c:showVal val="1"/>
+              <c:showCatName val="0"/>
+              <c:showSerName val="0"/>
+              <c:showPercent val="0"/>
+              <c:showBubbleSize val="0"/>
+            </c:dLbl>
+            <c:dLbl>
+              <c:idx val="1"/>
+              <c:tx>
+                <c:rich>
+                  <a:bodyPr/>
+                  <a:lstStyle/>
+                  <a:p>
+                    <a:r>
+                      <a:t>16%</a:t>
+                    </a:r>
+                  </a:p>
+                </c:rich>
+              </c:tx>
+              <c:showLegendKey val="0"/>
+              <c:showVal val="1"/>
+              <c:showCatName val="0"/>
+              <c:showSerName val="0"/>
+              <c:showPercent val="0"/>
+              <c:showBubbleSize val="0"/>
+            </c:dLbl>
+            <c:showLegendKey val="0"/>
+            <c:showVal val="0"/>
+            <c:showCatName val="0"/>
+            <c:showSerName val="0"/>
+            <c:showPercent val="0"/>
+            <c:showBubbleSize val="0"/>
+            <c:showLeaderLines val="1"/>
+          </c:dLbls>
           <c:cat>
             <c:strRef>
               <c:f>Sheet1!$A$2:$A$3</c:f>
@@ -185,17 +234,16 @@
                 <c:formatCode>General</c:formatCode>
                 <c:ptCount val="2"/>
                 <c:pt idx="0">
-                  <c:v>0.8575907590759075</c:v>
+                  <c:v>0.8413772991438748</c:v>
                 </c:pt>
                 <c:pt idx="1">
-                  <c:v>0.1424092409240924</c:v>
+                  <c:v>0.15862270085612515</c:v>
                 </c:pt>
               </c:numCache>
             </c:numRef>
           </c:val>
         </c:ser>
         <c:dLbls>
-          <c:numFmt formatCode="0%" sourceLinked="0"/>
           <c:showLegendKey val="0"/>
           <c:showVal val="0"/>
           <c:showCatName val="0"/>
@@ -288,6 +336,55 @@
               </a:solidFill>
             </c:spPr>
           </c:dPt>
+          <c:dLbls>
+            <c:dLbl>
+              <c:idx val="0"/>
+              <c:tx>
+                <c:rich>
+                  <a:bodyPr/>
+                  <a:lstStyle/>
+                  <a:p>
+                    <a:r>
+                      <a:t>83%</a:t>
+                    </a:r>
+                  </a:p>
+                </c:rich>
+              </c:tx>
+              <c:showLegendKey val="0"/>
+              <c:showVal val="1"/>
+              <c:showCatName val="0"/>
+              <c:showSerName val="0"/>
+              <c:showPercent val="0"/>
+              <c:showBubbleSize val="0"/>
+            </c:dLbl>
+            <c:dLbl>
+              <c:idx val="1"/>
+              <c:tx>
+                <c:rich>
+                  <a:bodyPr/>
+                  <a:lstStyle/>
+                  <a:p>
+                    <a:r>
+                      <a:t>17%</a:t>
+                    </a:r>
+                  </a:p>
+                </c:rich>
+              </c:tx>
+              <c:showLegendKey val="0"/>
+              <c:showVal val="1"/>
+              <c:showCatName val="0"/>
+              <c:showSerName val="0"/>
+              <c:showPercent val="0"/>
+              <c:showBubbleSize val="0"/>
+            </c:dLbl>
+            <c:showLegendKey val="0"/>
+            <c:showVal val="0"/>
+            <c:showCatName val="0"/>
+            <c:showSerName val="0"/>
+            <c:showPercent val="0"/>
+            <c:showBubbleSize val="0"/>
+            <c:showLeaderLines val="1"/>
+          </c:dLbls>
           <c:cat>
             <c:strRef>
               <c:f>Sheet1!$A$2:$A$3</c:f>
@@ -309,17 +406,16 @@
                 <c:formatCode>General</c:formatCode>
                 <c:ptCount val="2"/>
                 <c:pt idx="0">
-                  <c:v>0.8328859060402685</c:v>
+                  <c:v>0.8293535235876529</c:v>
                 </c:pt>
                 <c:pt idx="1">
-                  <c:v>0.16711409395973154</c:v>
+                  <c:v>0.17064647641234712</c:v>
                 </c:pt>
               </c:numCache>
             </c:numRef>
           </c:val>
         </c:ser>
         <c:dLbls>
-          <c:numFmt formatCode="0%" sourceLinked="0"/>
           <c:showLegendKey val="0"/>
           <c:showVal val="0"/>
           <c:showCatName val="0"/>
@@ -417,6 +513,55 @@
               </a:solidFill>
             </c:spPr>
           </c:dPt>
+          <c:dLbls>
+            <c:dLbl>
+              <c:idx val="0"/>
+              <c:tx>
+                <c:rich>
+                  <a:bodyPr/>
+                  <a:lstStyle/>
+                  <a:p>
+                    <a:r>
+                      <a:t>99%</a:t>
+                    </a:r>
+                  </a:p>
+                </c:rich>
+              </c:tx>
+              <c:showLegendKey val="0"/>
+              <c:showVal val="1"/>
+              <c:showCatName val="0"/>
+              <c:showSerName val="0"/>
+              <c:showPercent val="0"/>
+              <c:showBubbleSize val="0"/>
+            </c:dLbl>
+            <c:dLbl>
+              <c:idx val="1"/>
+              <c:tx>
+                <c:rich>
+                  <a:bodyPr/>
+                  <a:lstStyle/>
+                  <a:p>
+                    <a:r>
+                      <a:t>1%</a:t>
+                    </a:r>
+                  </a:p>
+                </c:rich>
+              </c:tx>
+              <c:showLegendKey val="0"/>
+              <c:showVal val="1"/>
+              <c:showCatName val="0"/>
+              <c:showSerName val="0"/>
+              <c:showPercent val="0"/>
+              <c:showBubbleSize val="0"/>
+            </c:dLbl>
+            <c:showLegendKey val="0"/>
+            <c:showVal val="0"/>
+            <c:showCatName val="0"/>
+            <c:showSerName val="0"/>
+            <c:showPercent val="0"/>
+            <c:showBubbleSize val="0"/>
+            <c:showLeaderLines val="1"/>
+          </c:dLbls>
           <c:cat>
             <c:strRef>
               <c:f>Sheet1!$A$2:$A$3</c:f>
@@ -438,17 +583,16 @@
                 <c:formatCode>General</c:formatCode>
                 <c:ptCount val="2"/>
                 <c:pt idx="0">
-                  <c:v>1.0</c:v>
+                  <c:v>0.9936842105263158</c:v>
                 </c:pt>
                 <c:pt idx="1">
-                  <c:v>0.0</c:v>
+                  <c:v>0.00631578947368421</c:v>
                 </c:pt>
               </c:numCache>
             </c:numRef>
           </c:val>
         </c:ser>
         <c:dLbls>
-          <c:numFmt formatCode="0%" sourceLinked="0"/>
           <c:showLegendKey val="0"/>
           <c:showVal val="0"/>
           <c:showCatName val="0"/>
@@ -541,6 +685,55 @@
               </a:solidFill>
             </c:spPr>
           </c:dPt>
+          <c:dLbls>
+            <c:dLbl>
+              <c:idx val="0"/>
+              <c:tx>
+                <c:rich>
+                  <a:bodyPr/>
+                  <a:lstStyle/>
+                  <a:p>
+                    <a:r>
+                      <a:t>11%</a:t>
+                    </a:r>
+                  </a:p>
+                </c:rich>
+              </c:tx>
+              <c:showLegendKey val="0"/>
+              <c:showVal val="1"/>
+              <c:showCatName val="0"/>
+              <c:showSerName val="0"/>
+              <c:showPercent val="0"/>
+              <c:showBubbleSize val="0"/>
+            </c:dLbl>
+            <c:dLbl>
+              <c:idx val="1"/>
+              <c:tx>
+                <c:rich>
+                  <a:bodyPr/>
+                  <a:lstStyle/>
+                  <a:p>
+                    <a:r>
+                      <a:t>89%</a:t>
+                    </a:r>
+                  </a:p>
+                </c:rich>
+              </c:tx>
+              <c:showLegendKey val="0"/>
+              <c:showVal val="1"/>
+              <c:showCatName val="0"/>
+              <c:showSerName val="0"/>
+              <c:showPercent val="0"/>
+              <c:showBubbleSize val="0"/>
+            </c:dLbl>
+            <c:showLegendKey val="0"/>
+            <c:showVal val="0"/>
+            <c:showCatName val="0"/>
+            <c:showSerName val="0"/>
+            <c:showPercent val="0"/>
+            <c:showBubbleSize val="0"/>
+            <c:showLeaderLines val="1"/>
+          </c:dLbls>
           <c:cat>
             <c:strRef>
               <c:f>Sheet1!$A$2:$A$3</c:f>
@@ -572,7 +765,6 @@
           </c:val>
         </c:ser>
         <c:dLbls>
-          <c:numFmt formatCode="0%" sourceLinked="0"/>
           <c:showLegendKey val="0"/>
           <c:showVal val="0"/>
           <c:showCatName val="0"/>
@@ -3778,7 +3970,7 @@
               <a:defRPr sz="1500"/>
             </a:pPr>
             <a:r>
-              <a:t>Filter checked: 42420</a:t>
+              <a:t>Filter checked: 48007</a:t>
             </a:r>
           </a:p>
           <a:p>
@@ -3786,7 +3978,7 @@
               <a:defRPr sz="1500"/>
             </a:pPr>
             <a:r>
-              <a:t>Succeeded: 36379</a:t>
+              <a:t>Succeeded: 40392</a:t>
             </a:r>
           </a:p>
           <a:p>
@@ -3794,7 +3986,7 @@
               <a:defRPr sz="1500"/>
             </a:pPr>
             <a:r>
-              <a:t>Failed: 6041</a:t>
+              <a:t>Failed: 7615</a:t>
             </a:r>
           </a:p>
         </p:txBody>
@@ -3843,7 +4035,7 @@
               <a:defRPr sz="1500"/>
             </a:pPr>
             <a:r>
-              <a:t>Filter checked: 1490</a:t>
+              <a:t>Filter checked: 1717</a:t>
             </a:r>
           </a:p>
           <a:p>
@@ -3851,7 +4043,7 @@
               <a:defRPr sz="1500"/>
             </a:pPr>
             <a:r>
-              <a:t>Succeeded: 1241</a:t>
+              <a:t>Succeeded: 1424</a:t>
             </a:r>
           </a:p>
           <a:p>
@@ -3859,7 +4051,7 @@
               <a:defRPr sz="1500"/>
             </a:pPr>
             <a:r>
-              <a:t>Failed: 249</a:t>
+              <a:t>Failed: 293</a:t>
             </a:r>
           </a:p>
         </p:txBody>
@@ -3908,7 +4100,7 @@
               <a:defRPr sz="1500"/>
             </a:pPr>
             <a:r>
-              <a:t>Filter checked: 10</a:t>
+              <a:t>Filter checked: 950</a:t>
             </a:r>
           </a:p>
           <a:p>
@@ -3916,7 +4108,7 @@
               <a:defRPr sz="1500"/>
             </a:pPr>
             <a:r>
-              <a:t>Succeeded: 10</a:t>
+              <a:t>Succeeded: 944</a:t>
             </a:r>
           </a:p>
           <a:p>
@@ -3924,7 +4116,7 @@
               <a:defRPr sz="1500"/>
             </a:pPr>
             <a:r>
-              <a:t>Failed: 0</a:t>
+              <a:t>Failed: 6</a:t>
             </a:r>
           </a:p>
         </p:txBody>

</xml_diff>